<commit_message>
Quantile regression content added
</commit_message>
<xml_diff>
--- a/Owner-occupied dwelling and imputed rent/presentation.pptx
+++ b/Owner-occupied dwelling and imputed rent/presentation.pptx
@@ -5,10 +5,10 @@
     <p:sldMasterId id="2147483708" r:id="rId4"/>
   </p:sldMasterIdLst>
   <p:notesMasterIdLst>
-    <p:notesMasterId r:id="rId50"/>
+    <p:notesMasterId r:id="rId55"/>
   </p:notesMasterIdLst>
   <p:handoutMasterIdLst>
-    <p:handoutMasterId r:id="rId51"/>
+    <p:handoutMasterId r:id="rId56"/>
   </p:handoutMasterIdLst>
   <p:sldIdLst>
     <p:sldId id="256" r:id="rId5"/>
@@ -56,6 +56,11 @@
     <p:sldId id="706" r:id="rId47"/>
     <p:sldId id="707" r:id="rId48"/>
     <p:sldId id="708" r:id="rId49"/>
+    <p:sldId id="711" r:id="rId50"/>
+    <p:sldId id="710" r:id="rId51"/>
+    <p:sldId id="712" r:id="rId52"/>
+    <p:sldId id="713" r:id="rId53"/>
+    <p:sldId id="709" r:id="rId54"/>
   </p:sldIdLst>
   <p:sldSz cx="12192000" cy="6858000"/>
   <p:notesSz cx="9925050" cy="6792913"/>
@@ -273,7 +278,7 @@
           <a:p>
             <a:fld id="{2F51DC69-60C3-4CF7-A135-6E702ECCE0F0}" type="datetimeFigureOut">
               <a:rPr lang="en-US" smtClean="0"/>
-              <a:t>6/26/2024</a:t>
+              <a:t>6/27/2024</a:t>
             </a:fld>
             <a:endParaRPr lang="en-US" dirty="0"/>
           </a:p>
@@ -450,7 +455,7 @@
           <a:p>
             <a:fld id="{36E3EC7B-6C72-4FBB-87DF-2BD2CB7DC1E6}" type="datetimeFigureOut">
               <a:rPr lang="en-US" smtClean="0"/>
-              <a:t>6/26/2024</a:t>
+              <a:t>6/27/2024</a:t>
             </a:fld>
             <a:endParaRPr lang="en-US" dirty="0"/>
           </a:p>
@@ -1141,6 +1146,90 @@
 </p:notes>
 </file>
 
+<file path=ppt/notesSlides/notesSlide6.xml><?xml version="1.0" encoding="utf-8"?>
+<p:notes xmlns:a="http://schemas.openxmlformats.org/drawingml/2006/main" xmlns:r="http://schemas.openxmlformats.org/officeDocument/2006/relationships" xmlns:p="http://schemas.openxmlformats.org/presentationml/2006/main">
+  <p:cSld>
+    <p:spTree>
+      <p:nvGrpSpPr>
+        <p:cNvPr id="1" name=""/>
+        <p:cNvGrpSpPr/>
+        <p:nvPr/>
+      </p:nvGrpSpPr>
+      <p:grpSpPr>
+        <a:xfrm>
+          <a:off x="0" y="0"/>
+          <a:ext cx="0" cy="0"/>
+          <a:chOff x="0" y="0"/>
+          <a:chExt cx="0" cy="0"/>
+        </a:xfrm>
+      </p:grpSpPr>
+      <p:sp>
+        <p:nvSpPr>
+          <p:cNvPr id="2" name="Slide Image Placeholder 1"/>
+          <p:cNvSpPr>
+            <a:spLocks noGrp="1" noRot="1" noChangeAspect="1"/>
+          </p:cNvSpPr>
+          <p:nvPr>
+            <p:ph type="sldImg"/>
+          </p:nvPr>
+        </p:nvSpPr>
+        <p:spPr/>
+      </p:sp>
+      <p:sp>
+        <p:nvSpPr>
+          <p:cNvPr id="3" name="Notes Placeholder 2"/>
+          <p:cNvSpPr>
+            <a:spLocks noGrp="1"/>
+          </p:cNvSpPr>
+          <p:nvPr>
+            <p:ph type="body" idx="1"/>
+          </p:nvPr>
+        </p:nvSpPr>
+        <p:spPr/>
+        <p:txBody>
+          <a:bodyPr/>
+          <a:lstStyle/>
+          <a:p>
+            <a:endParaRPr lang="en-US"/>
+          </a:p>
+        </p:txBody>
+      </p:sp>
+      <p:sp>
+        <p:nvSpPr>
+          <p:cNvPr id="4" name="Slide Number Placeholder 3"/>
+          <p:cNvSpPr>
+            <a:spLocks noGrp="1"/>
+          </p:cNvSpPr>
+          <p:nvPr>
+            <p:ph type="sldNum" sz="quarter" idx="5"/>
+          </p:nvPr>
+        </p:nvSpPr>
+        <p:spPr/>
+        <p:txBody>
+          <a:bodyPr/>
+          <a:lstStyle/>
+          <a:p>
+            <a:fld id="{B262A795-6F94-4A96-B820-B9038480D048}" type="slidenum">
+              <a:rPr lang="en-US" smtClean="0"/>
+              <a:t>50</a:t>
+            </a:fld>
+            <a:endParaRPr lang="en-US" dirty="0"/>
+          </a:p>
+        </p:txBody>
+      </p:sp>
+    </p:spTree>
+    <p:extLst>
+      <p:ext uri="{BB962C8B-B14F-4D97-AF65-F5344CB8AC3E}">
+        <p14:creationId xmlns:p14="http://schemas.microsoft.com/office/powerpoint/2010/main" val="1091334457"/>
+      </p:ext>
+    </p:extLst>
+  </p:cSld>
+  <p:clrMapOvr>
+    <a:masterClrMapping/>
+  </p:clrMapOvr>
+</p:notes>
+</file>
+
 <file path=ppt/slideLayouts/slideLayout1.xml><?xml version="1.0" encoding="utf-8"?>
 <p:sldLayout xmlns:a="http://schemas.openxmlformats.org/drawingml/2006/main" xmlns:r="http://schemas.openxmlformats.org/officeDocument/2006/relationships" xmlns:p="http://schemas.openxmlformats.org/presentationml/2006/main" type="title" preserve="1">
   <p:cSld name="Title Slide">
@@ -1288,7 +1377,7 @@
           <a:p>
             <a:fld id="{5BC347C2-FA20-4391-9602-AFA57163C632}" type="datetime8">
               <a:rPr lang="en-US" smtClean="0"/>
-              <a:t>6/26/2024 6:38 PM</a:t>
+              <a:t>6/27/2024 7:12 AM</a:t>
             </a:fld>
             <a:endParaRPr lang="en-US" dirty="0"/>
           </a:p>
@@ -1486,7 +1575,7 @@
           <a:p>
             <a:fld id="{91668C46-73EA-4BCB-83C2-FA698C9DE3BE}" type="datetime8">
               <a:rPr lang="en-US" smtClean="0"/>
-              <a:t>6/26/2024 6:38 PM</a:t>
+              <a:t>6/27/2024 7:12 AM</a:t>
             </a:fld>
             <a:endParaRPr lang="en-US" dirty="0"/>
           </a:p>
@@ -1694,7 +1783,7 @@
           <a:p>
             <a:fld id="{19DA1AB9-5636-4FDF-8D18-1F1831E22E7A}" type="datetime8">
               <a:rPr lang="en-US" smtClean="0"/>
-              <a:t>6/26/2024 6:38 PM</a:t>
+              <a:t>6/27/2024 7:12 AM</a:t>
             </a:fld>
             <a:endParaRPr lang="en-US" dirty="0"/>
           </a:p>
@@ -1892,7 +1981,7 @@
           <a:p>
             <a:fld id="{BD53A9F3-9DCE-4543-9F1F-BE2EF1387A7B}" type="datetime8">
               <a:rPr lang="en-US" smtClean="0"/>
-              <a:t>6/26/2024 6:38 PM</a:t>
+              <a:t>6/27/2024 7:12 AM</a:t>
             </a:fld>
             <a:endParaRPr lang="en-US" dirty="0"/>
           </a:p>
@@ -2167,7 +2256,7 @@
           <a:p>
             <a:fld id="{8335EFBD-44A5-4F9F-A74D-F93E69ACF93E}" type="datetime8">
               <a:rPr lang="en-US" smtClean="0"/>
-              <a:t>6/26/2024 6:38 PM</a:t>
+              <a:t>6/27/2024 7:12 AM</a:t>
             </a:fld>
             <a:endParaRPr lang="en-US" dirty="0"/>
           </a:p>
@@ -2432,7 +2521,7 @@
           <a:p>
             <a:fld id="{909111FB-DFC6-4032-A144-367F55503336}" type="datetime8">
               <a:rPr lang="en-US" smtClean="0"/>
-              <a:t>6/26/2024 6:38 PM</a:t>
+              <a:t>6/27/2024 7:12 AM</a:t>
             </a:fld>
             <a:endParaRPr lang="en-US" dirty="0"/>
           </a:p>
@@ -2844,7 +2933,7 @@
           <a:p>
             <a:fld id="{80F570C4-FABD-4DF4-AD77-FB26D9845792}" type="datetime8">
               <a:rPr lang="en-US" smtClean="0"/>
-              <a:t>6/26/2024 6:38 PM</a:t>
+              <a:t>6/27/2024 7:12 AM</a:t>
             </a:fld>
             <a:endParaRPr lang="en-US" dirty="0"/>
           </a:p>
@@ -2985,7 +3074,7 @@
           <a:p>
             <a:fld id="{BC528DA7-90E1-44A4-8DA7-14CD2567BF23}" type="datetime8">
               <a:rPr lang="en-US" smtClean="0"/>
-              <a:t>6/26/2024 6:38 PM</a:t>
+              <a:t>6/27/2024 7:12 AM</a:t>
             </a:fld>
             <a:endParaRPr lang="en-US" dirty="0"/>
           </a:p>
@@ -3098,7 +3187,7 @@
           <a:p>
             <a:fld id="{45E09CC8-D4F3-4166-9447-07AD56F78E31}" type="datetime8">
               <a:rPr lang="en-US" smtClean="0"/>
-              <a:t>6/26/2024 6:38 PM</a:t>
+              <a:t>6/27/2024 7:12 AM</a:t>
             </a:fld>
             <a:endParaRPr lang="en-US" dirty="0"/>
           </a:p>
@@ -3409,7 +3498,7 @@
           <a:p>
             <a:fld id="{6EE838D3-3EAA-4157-B317-F7DAA2145583}" type="datetime8">
               <a:rPr lang="en-US" smtClean="0"/>
-              <a:t>6/26/2024 6:38 PM</a:t>
+              <a:t>6/27/2024 7:12 AM</a:t>
             </a:fld>
             <a:endParaRPr lang="en-US" dirty="0"/>
           </a:p>
@@ -3697,7 +3786,7 @@
           <a:p>
             <a:fld id="{3E5406BB-5A4E-4BF0-92B8-E34AC631FF5D}" type="datetime8">
               <a:rPr lang="en-US" smtClean="0"/>
-              <a:t>6/26/2024 6:38 PM</a:t>
+              <a:t>6/27/2024 7:12 AM</a:t>
             </a:fld>
             <a:endParaRPr lang="en-US" dirty="0"/>
           </a:p>
@@ -3938,7 +4027,7 @@
           <a:p>
             <a:fld id="{4C10F5C2-A22A-42F5-A3A7-2B6A6B51B4FE}" type="datetime8">
               <a:rPr lang="en-US" smtClean="0"/>
-              <a:t>6/26/2024 6:38 PM</a:t>
+              <a:t>6/27/2024 7:12 AM</a:t>
             </a:fld>
             <a:endParaRPr lang="en-US" dirty="0"/>
           </a:p>
@@ -4887,7 +4976,7 @@
           <a:p>
             <a:fld id="{BD53A9F3-9DCE-4543-9F1F-BE2EF1387A7B}" type="datetime8">
               <a:rPr lang="en-US" smtClean="0"/>
-              <a:t>6/26/2024 6:38 PM</a:t>
+              <a:t>6/27/2024 7:12 AM</a:t>
             </a:fld>
             <a:endParaRPr lang="en-US" dirty="0"/>
           </a:p>
@@ -5062,7 +5151,7 @@
           <a:p>
             <a:fld id="{BD53A9F3-9DCE-4543-9F1F-BE2EF1387A7B}" type="datetime8">
               <a:rPr lang="en-US" smtClean="0"/>
-              <a:t>6/26/2024 6:38 PM</a:t>
+              <a:t>6/27/2024 7:12 AM</a:t>
             </a:fld>
             <a:endParaRPr lang="en-US" dirty="0"/>
           </a:p>
@@ -5217,7 +5306,7 @@
           <a:p>
             <a:fld id="{BD53A9F3-9DCE-4543-9F1F-BE2EF1387A7B}" type="datetime8">
               <a:rPr lang="en-US" smtClean="0"/>
-              <a:t>6/26/2024 6:38 PM</a:t>
+              <a:t>6/27/2024 7:12 AM</a:t>
             </a:fld>
             <a:endParaRPr lang="en-US" dirty="0"/>
           </a:p>
@@ -5765,7 +5854,7 @@
           <a:p>
             <a:fld id="{121A92AE-D6FC-4EA3-AB09-8AEC31FD403C}" type="datetime8">
               <a:rPr lang="en-US" smtClean="0"/>
-              <a:t>6/26/2024 6:38 PM</a:t>
+              <a:t>6/27/2024 7:12 AM</a:t>
             </a:fld>
             <a:endParaRPr lang="en-US" dirty="0"/>
           </a:p>
@@ -6007,7 +6096,7 @@
           <a:p>
             <a:fld id="{A8AD868F-8409-4F04-87B4-D0383043B754}" type="datetime8">
               <a:rPr lang="en-US" smtClean="0"/>
-              <a:t>6/26/2024 6:38 PM</a:t>
+              <a:t>6/27/2024 7:12 AM</a:t>
             </a:fld>
             <a:endParaRPr lang="en-US" dirty="0"/>
           </a:p>
@@ -6346,7 +6435,7 @@
           <a:p>
             <a:fld id="{A8AD868F-8409-4F04-87B4-D0383043B754}" type="datetime8">
               <a:rPr lang="en-US" smtClean="0"/>
-              <a:t>6/26/2024 6:38 PM</a:t>
+              <a:t>6/27/2024 7:12 AM</a:t>
             </a:fld>
             <a:endParaRPr lang="en-US" dirty="0"/>
           </a:p>
@@ -6434,7 +6523,7 @@
           <a:p>
             <a:fld id="{BD53A9F3-9DCE-4543-9F1F-BE2EF1387A7B}" type="datetime8">
               <a:rPr lang="en-US" smtClean="0"/>
-              <a:t>6/26/2024 6:38 PM</a:t>
+              <a:t>6/27/2024 7:12 AM</a:t>
             </a:fld>
             <a:endParaRPr lang="en-US" dirty="0"/>
           </a:p>
@@ -6617,7 +6706,7 @@
           <a:p>
             <a:fld id="{BD53A9F3-9DCE-4543-9F1F-BE2EF1387A7B}" type="datetime8">
               <a:rPr lang="en-US" smtClean="0"/>
-              <a:t>6/26/2024 6:38 PM</a:t>
+              <a:t>6/27/2024 7:12 AM</a:t>
             </a:fld>
             <a:endParaRPr lang="en-US" dirty="0"/>
           </a:p>
@@ -6740,7 +6829,7 @@
           <a:p>
             <a:fld id="{BD53A9F3-9DCE-4543-9F1F-BE2EF1387A7B}" type="datetime8">
               <a:rPr lang="en-US" smtClean="0"/>
-              <a:t>6/26/2024 6:38 PM</a:t>
+              <a:t>6/27/2024 7:12 AM</a:t>
             </a:fld>
             <a:endParaRPr lang="en-US" dirty="0"/>
           </a:p>
@@ -7004,7 +7093,7 @@
           <a:p>
             <a:fld id="{A8AD868F-8409-4F04-87B4-D0383043B754}" type="datetime8">
               <a:rPr lang="en-US" smtClean="0"/>
-              <a:t>6/26/2024 6:38 PM</a:t>
+              <a:t>6/27/2024 7:12 AM</a:t>
             </a:fld>
             <a:endParaRPr lang="en-US" dirty="0"/>
           </a:p>
@@ -7471,7 +7560,7 @@
           <a:p>
             <a:fld id="{121A92AE-D6FC-4EA3-AB09-8AEC31FD403C}" type="datetime8">
               <a:rPr lang="en-US" smtClean="0"/>
-              <a:t>6/26/2024 6:38 PM</a:t>
+              <a:t>6/27/2024 7:12 AM</a:t>
             </a:fld>
             <a:endParaRPr lang="en-US" dirty="0"/>
           </a:p>
@@ -7559,7 +7648,7 @@
           <a:p>
             <a:fld id="{BD53A9F3-9DCE-4543-9F1F-BE2EF1387A7B}" type="datetime8">
               <a:rPr lang="en-US" smtClean="0"/>
-              <a:t>6/26/2024 6:38 PM</a:t>
+              <a:t>6/27/2024 7:12 AM</a:t>
             </a:fld>
             <a:endParaRPr lang="en-US" dirty="0"/>
           </a:p>
@@ -7813,7 +7902,7 @@
           <a:p>
             <a:fld id="{A8AD868F-8409-4F04-87B4-D0383043B754}" type="datetime8">
               <a:rPr lang="en-US" smtClean="0"/>
-              <a:t>6/26/2024 10:43 PM</a:t>
+              <a:t>6/27/2024 7:12 AM</a:t>
             </a:fld>
             <a:endParaRPr lang="en-US" dirty="0"/>
           </a:p>
@@ -7936,7 +8025,7 @@
           <a:p>
             <a:fld id="{BD53A9F3-9DCE-4543-9F1F-BE2EF1387A7B}" type="datetime8">
               <a:rPr lang="en-US" smtClean="0"/>
-              <a:t>6/26/2024 6:38 PM</a:t>
+              <a:t>6/27/2024 7:12 AM</a:t>
             </a:fld>
             <a:endParaRPr lang="en-US" dirty="0"/>
           </a:p>
@@ -8089,7 +8178,7 @@
           <a:p>
             <a:fld id="{BD53A9F3-9DCE-4543-9F1F-BE2EF1387A7B}" type="datetime8">
               <a:rPr lang="en-US" smtClean="0"/>
-              <a:t>6/26/2024 6:38 PM</a:t>
+              <a:t>6/27/2024 7:12 AM</a:t>
             </a:fld>
             <a:endParaRPr lang="en-US" dirty="0"/>
           </a:p>
@@ -8242,7 +8331,7 @@
           <a:p>
             <a:fld id="{BD53A9F3-9DCE-4543-9F1F-BE2EF1387A7B}" type="datetime8">
               <a:rPr lang="en-US" smtClean="0"/>
-              <a:t>6/26/2024 6:38 PM</a:t>
+              <a:t>6/27/2024 7:12 AM</a:t>
             </a:fld>
             <a:endParaRPr lang="en-US" dirty="0"/>
           </a:p>
@@ -8395,7 +8484,7 @@
           <a:p>
             <a:fld id="{BD53A9F3-9DCE-4543-9F1F-BE2EF1387A7B}" type="datetime8">
               <a:rPr lang="en-US" smtClean="0"/>
-              <a:t>6/26/2024 6:38 PM</a:t>
+              <a:t>6/27/2024 7:12 AM</a:t>
             </a:fld>
             <a:endParaRPr lang="en-US" dirty="0"/>
           </a:p>
@@ -8557,7 +8646,7 @@
           <a:p>
             <a:fld id="{BD53A9F3-9DCE-4543-9F1F-BE2EF1387A7B}" type="datetime8">
               <a:rPr lang="en-US" smtClean="0"/>
-              <a:t>6/26/2024 6:38 PM</a:t>
+              <a:t>6/27/2024 7:12 AM</a:t>
             </a:fld>
             <a:endParaRPr lang="en-US" dirty="0"/>
           </a:p>
@@ -8722,7 +8811,7 @@
           <a:p>
             <a:fld id="{BD53A9F3-9DCE-4543-9F1F-BE2EF1387A7B}" type="datetime8">
               <a:rPr lang="en-US" smtClean="0"/>
-              <a:t>6/26/2024 6:38 PM</a:t>
+              <a:t>6/27/2024 7:12 AM</a:t>
             </a:fld>
             <a:endParaRPr lang="en-US" dirty="0"/>
           </a:p>
@@ -9060,7 +9149,7 @@
           <a:p>
             <a:fld id="{A8AD868F-8409-4F04-87B4-D0383043B754}" type="datetime8">
               <a:rPr lang="en-US" smtClean="0"/>
-              <a:t>6/26/2024 6:38 PM</a:t>
+              <a:t>6/27/2024 7:12 AM</a:t>
             </a:fld>
             <a:endParaRPr lang="en-US" dirty="0"/>
           </a:p>
@@ -9148,7 +9237,7 @@
           <a:p>
             <a:fld id="{BD53A9F3-9DCE-4543-9F1F-BE2EF1387A7B}" type="datetime8">
               <a:rPr lang="en-US" smtClean="0"/>
-              <a:t>6/26/2024 6:38 PM</a:t>
+              <a:t>6/27/2024 7:12 AM</a:t>
             </a:fld>
             <a:endParaRPr lang="en-US" dirty="0"/>
           </a:p>
@@ -9412,7 +9501,7 @@
           <a:p>
             <a:fld id="{A8AD868F-8409-4F04-87B4-D0383043B754}" type="datetime8">
               <a:rPr lang="en-US" smtClean="0"/>
-              <a:t>6/26/2024 6:38 PM</a:t>
+              <a:t>6/27/2024 7:12 AM</a:t>
             </a:fld>
             <a:endParaRPr lang="en-US" dirty="0"/>
           </a:p>
@@ -9500,7 +9589,7 @@
           <a:p>
             <a:fld id="{BD53A9F3-9DCE-4543-9F1F-BE2EF1387A7B}" type="datetime8">
               <a:rPr lang="en-US" smtClean="0"/>
-              <a:t>6/26/2024 6:38 PM</a:t>
+              <a:t>6/27/2024 7:12 AM</a:t>
             </a:fld>
             <a:endParaRPr lang="en-US" dirty="0"/>
           </a:p>
@@ -9653,7 +9742,7 @@
           <a:p>
             <a:fld id="{BD53A9F3-9DCE-4543-9F1F-BE2EF1387A7B}" type="datetime8">
               <a:rPr lang="en-US" smtClean="0"/>
-              <a:t>6/26/2024 6:38 PM</a:t>
+              <a:t>6/27/2024 7:12 AM</a:t>
             </a:fld>
             <a:endParaRPr lang="en-US" dirty="0"/>
           </a:p>
@@ -9841,7 +9930,7 @@
           <a:p>
             <a:fld id="{A8AD868F-8409-4F04-87B4-D0383043B754}" type="datetime8">
               <a:rPr lang="en-US" smtClean="0"/>
-              <a:t>6/26/2024 6:38 PM</a:t>
+              <a:t>6/27/2024 7:12 AM</a:t>
             </a:fld>
             <a:endParaRPr lang="en-US" dirty="0"/>
           </a:p>
@@ -9959,7 +10048,7 @@
           <a:p>
             <a:fld id="{A8AD868F-8409-4F04-87B4-D0383043B754}" type="datetime8">
               <a:rPr lang="en-US" smtClean="0"/>
-              <a:t>6/26/2024 6:51 PM</a:t>
+              <a:t>6/27/2024 7:12 AM</a:t>
             </a:fld>
             <a:endParaRPr lang="en-US" dirty="0"/>
           </a:p>
@@ -10192,7 +10281,7 @@
           <a:p>
             <a:fld id="{A8AD868F-8409-4F04-87B4-D0383043B754}" type="datetime8">
               <a:rPr lang="en-US" smtClean="0"/>
-              <a:t>6/26/2024 6:58 PM</a:t>
+              <a:t>6/27/2024 7:12 AM</a:t>
             </a:fld>
             <a:endParaRPr lang="en-US" dirty="0"/>
           </a:p>
@@ -10425,7 +10514,7 @@
           <a:p>
             <a:fld id="{A8AD868F-8409-4F04-87B4-D0383043B754}" type="datetime8">
               <a:rPr lang="en-US" smtClean="0"/>
-              <a:t>6/26/2024 7:02 PM</a:t>
+              <a:t>6/27/2024 7:12 AM</a:t>
             </a:fld>
             <a:endParaRPr lang="en-US" dirty="0"/>
           </a:p>
@@ -10658,7 +10747,7 @@
           <a:p>
             <a:fld id="{A8AD868F-8409-4F04-87B4-D0383043B754}" type="datetime8">
               <a:rPr lang="en-US" smtClean="0"/>
-              <a:t>6/26/2024 7:01 PM</a:t>
+              <a:t>6/27/2024 7:12 AM</a:t>
             </a:fld>
             <a:endParaRPr lang="en-US" dirty="0"/>
           </a:p>
@@ -10945,7 +11034,7 @@
           <a:p>
             <a:fld id="{A8AD868F-8409-4F04-87B4-D0383043B754}" type="datetime8">
               <a:rPr lang="en-US" smtClean="0"/>
-              <a:t>6/26/2024 7:15 PM</a:t>
+              <a:t>6/27/2024 7:12 AM</a:t>
             </a:fld>
             <a:endParaRPr lang="en-US" dirty="0"/>
           </a:p>
@@ -11239,7 +11328,7 @@
           <a:p>
             <a:fld id="{A8AD868F-8409-4F04-87B4-D0383043B754}" type="datetime8">
               <a:rPr lang="en-US" smtClean="0"/>
-              <a:t>6/26/2024 8:02 PM</a:t>
+              <a:t>6/27/2024 7:12 AM</a:t>
             </a:fld>
             <a:endParaRPr lang="en-US" dirty="0"/>
           </a:p>
@@ -11405,7 +11494,7 @@
           <a:p>
             <a:fld id="{A8AD868F-8409-4F04-87B4-D0383043B754}" type="datetime8">
               <a:rPr lang="en-US" smtClean="0"/>
-              <a:t>6/26/2024 9:11 PM</a:t>
+              <a:t>6/27/2024 7:12 AM</a:t>
             </a:fld>
             <a:endParaRPr lang="en-US" dirty="0"/>
           </a:p>
@@ -11671,7 +11760,7 @@
           <a:p>
             <a:fld id="{A8AD868F-8409-4F04-87B4-D0383043B754}" type="datetime8">
               <a:rPr lang="en-US" smtClean="0"/>
-              <a:t>6/26/2024 6:38 PM</a:t>
+              <a:t>6/27/2024 7:12 AM</a:t>
             </a:fld>
             <a:endParaRPr lang="en-US" dirty="0"/>
           </a:p>
@@ -11789,7 +11878,7 @@
           <a:p>
             <a:fld id="{A8AD868F-8409-4F04-87B4-D0383043B754}" type="datetime8">
               <a:rPr lang="en-US" smtClean="0"/>
-              <a:t>6/26/2024 9:15 PM</a:t>
+              <a:t>6/27/2024 7:12 AM</a:t>
             </a:fld>
             <a:endParaRPr lang="en-US" dirty="0"/>
           </a:p>
@@ -11955,7 +12044,7 @@
           <a:p>
             <a:fld id="{A8AD868F-8409-4F04-87B4-D0383043B754}" type="datetime8">
               <a:rPr lang="en-US" smtClean="0"/>
-              <a:t>6/26/2024 9:44 PM</a:t>
+              <a:t>6/27/2024 7:12 AM</a:t>
             </a:fld>
             <a:endParaRPr lang="en-US" dirty="0"/>
           </a:p>
@@ -12300,7 +12389,7 @@
           <a:p>
             <a:fld id="{A8AD868F-8409-4F04-87B4-D0383043B754}" type="datetime8">
               <a:rPr lang="en-US" smtClean="0"/>
-              <a:t>6/26/2024 9:54 PM</a:t>
+              <a:t>6/27/2024 7:12 AM</a:t>
             </a:fld>
             <a:endParaRPr lang="en-US" dirty="0"/>
           </a:p>
@@ -12907,7 +12996,7 @@
           <a:p>
             <a:fld id="{A8AD868F-8409-4F04-87B4-D0383043B754}" type="datetime8">
               <a:rPr lang="en-US" smtClean="0"/>
-              <a:t>6/26/2024 11:16 PM</a:t>
+              <a:t>6/27/2024 7:12 AM</a:t>
             </a:fld>
             <a:endParaRPr lang="en-US" dirty="0"/>
           </a:p>
@@ -13025,7 +13114,7 @@
           <a:p>
             <a:fld id="{BD53A9F3-9DCE-4543-9F1F-BE2EF1387A7B}" type="datetime8">
               <a:rPr lang="en-US" smtClean="0"/>
-              <a:t>6/26/2024 11:18 PM</a:t>
+              <a:t>6/27/2024 7:12 AM</a:t>
             </a:fld>
             <a:endParaRPr lang="en-US" dirty="0"/>
           </a:p>
@@ -13494,7 +13583,7 @@
                 </a:solidFill>
                 <a:latin typeface="Amasis MT Pro Black" panose="02040A04050005020304" pitchFamily="18" charset="0"/>
               </a:rPr>
-              <a:t>Thank You</a:t>
+              <a:t>Quantile Regression as an alternative to Hedonic Pricing</a:t>
             </a:r>
           </a:p>
         </p:txBody>
@@ -13522,7 +13611,7 @@
           <a:p>
             <a:fld id="{121A92AE-D6FC-4EA3-AB09-8AEC31FD403C}" type="datetime8">
               <a:rPr lang="en-US" smtClean="0"/>
-              <a:t>6/26/2024 11:19 PM</a:t>
+              <a:t>6/27/2024 7:12 AM</a:t>
             </a:fld>
             <a:endParaRPr lang="en-US" dirty="0"/>
           </a:p>
@@ -13566,6 +13655,725 @@
   </p:cSld>
   <p:clrMapOvr>
     <a:overrideClrMapping bg1="dk1" tx1="lt1" bg2="dk2" tx2="lt2" accent1="accent1" accent2="accent2" accent3="accent3" accent4="accent4" accent5="accent5" accent6="accent6" hlink="hlink" folHlink="folHlink"/>
+  </p:clrMapOvr>
+</p:sld>
+</file>
+
+<file path=ppt/slides/slide46.xml><?xml version="1.0" encoding="utf-8"?>
+<p:sld xmlns:a="http://schemas.openxmlformats.org/drawingml/2006/main" xmlns:r="http://schemas.openxmlformats.org/officeDocument/2006/relationships" xmlns:p="http://schemas.openxmlformats.org/presentationml/2006/main">
+  <p:cSld>
+    <p:spTree>
+      <p:nvGrpSpPr>
+        <p:cNvPr id="1" name=""/>
+        <p:cNvGrpSpPr/>
+        <p:nvPr/>
+      </p:nvGrpSpPr>
+      <p:grpSpPr>
+        <a:xfrm>
+          <a:off x="0" y="0"/>
+          <a:ext cx="0" cy="0"/>
+          <a:chOff x="0" y="0"/>
+          <a:chExt cx="0" cy="0"/>
+        </a:xfrm>
+      </p:grpSpPr>
+      <p:sp>
+        <p:nvSpPr>
+          <p:cNvPr id="2" name="Title 1">
+            <a:extLst>
+              <a:ext uri="{FF2B5EF4-FFF2-40B4-BE49-F238E27FC236}">
+                <a16:creationId xmlns:a16="http://schemas.microsoft.com/office/drawing/2014/main" id="{EB68B490-BCF0-4C36-80D5-86B59D568E72}"/>
+              </a:ext>
+            </a:extLst>
+          </p:cNvPr>
+          <p:cNvSpPr>
+            <a:spLocks noGrp="1"/>
+          </p:cNvSpPr>
+          <p:nvPr>
+            <p:ph type="title"/>
+          </p:nvPr>
+        </p:nvSpPr>
+        <p:spPr>
+          <a:xfrm>
+            <a:off x="838200" y="365126"/>
+            <a:ext cx="10515600" cy="722270"/>
+          </a:xfrm>
+        </p:spPr>
+        <p:txBody>
+          <a:bodyPr/>
+          <a:lstStyle/>
+          <a:p>
+            <a:r>
+              <a:rPr lang="en-US" dirty="0">
+                <a:latin typeface="Amasis MT Pro Black" panose="02040A04050005020304" pitchFamily="18" charset="0"/>
+              </a:rPr>
+              <a:t>Benefits of quantile regression</a:t>
+            </a:r>
+          </a:p>
+        </p:txBody>
+      </p:sp>
+      <p:sp>
+        <p:nvSpPr>
+          <p:cNvPr id="45" name="Content Placeholder 2">
+            <a:extLst>
+              <a:ext uri="{FF2B5EF4-FFF2-40B4-BE49-F238E27FC236}">
+                <a16:creationId xmlns:a16="http://schemas.microsoft.com/office/drawing/2014/main" id="{2BC40948-B7E2-46A0-B125-C6CB1A282CAD}"/>
+              </a:ext>
+            </a:extLst>
+          </p:cNvPr>
+          <p:cNvSpPr>
+            <a:spLocks noGrp="1"/>
+          </p:cNvSpPr>
+          <p:nvPr>
+            <p:ph idx="1"/>
+          </p:nvPr>
+        </p:nvSpPr>
+        <p:spPr>
+          <a:xfrm>
+            <a:off x="1066800" y="1269958"/>
+            <a:ext cx="10287000" cy="4592960"/>
+          </a:xfrm>
+        </p:spPr>
+        <p:txBody>
+          <a:bodyPr>
+            <a:normAutofit/>
+          </a:bodyPr>
+          <a:lstStyle/>
+          <a:p>
+            <a:r>
+              <a:rPr lang="en-US" b="1" dirty="0">
+                <a:solidFill>
+                  <a:srgbClr val="374151"/>
+                </a:solidFill>
+                <a:latin typeface="Amasis MT Pro" panose="02040504050005020304" pitchFamily="18" charset="0"/>
+              </a:rPr>
+              <a:t>Varying effects on different quantiles: </a:t>
+            </a:r>
+            <a:r>
+              <a:rPr lang="en-US" dirty="0">
+                <a:solidFill>
+                  <a:srgbClr val="374151"/>
+                </a:solidFill>
+                <a:latin typeface="Amasis MT Pro" panose="02040504050005020304" pitchFamily="18" charset="0"/>
+              </a:rPr>
+              <a:t>OLS calculates conditional means only. QR shows how relationships change across different quantiles.</a:t>
+            </a:r>
+          </a:p>
+          <a:p>
+            <a:r>
+              <a:rPr lang="en-US" b="1" dirty="0">
+                <a:solidFill>
+                  <a:srgbClr val="374151"/>
+                </a:solidFill>
+                <a:latin typeface="Amasis MT Pro" panose="02040504050005020304" pitchFamily="18" charset="0"/>
+              </a:rPr>
+              <a:t>Outlier Influence: </a:t>
+            </a:r>
+            <a:r>
+              <a:rPr lang="en-US" dirty="0">
+                <a:solidFill>
+                  <a:srgbClr val="374151"/>
+                </a:solidFill>
+                <a:latin typeface="Amasis MT Pro" panose="02040504050005020304" pitchFamily="18" charset="0"/>
+              </a:rPr>
+              <a:t>Mitigates the influence of outliers. Useful for skewed or heavy-tailed data</a:t>
+            </a:r>
+          </a:p>
+          <a:p>
+            <a:r>
+              <a:rPr lang="en-US" b="1" dirty="0">
+                <a:solidFill>
+                  <a:srgbClr val="374151"/>
+                </a:solidFill>
+                <a:latin typeface="Amasis MT Pro" panose="02040504050005020304" pitchFamily="18" charset="0"/>
+              </a:rPr>
+              <a:t>Non-Normal Errors:</a:t>
+            </a:r>
+            <a:r>
+              <a:rPr lang="en-US" dirty="0">
+                <a:solidFill>
+                  <a:srgbClr val="374151"/>
+                </a:solidFill>
+                <a:latin typeface="Amasis MT Pro" panose="02040504050005020304" pitchFamily="18" charset="0"/>
+              </a:rPr>
+              <a:t> OLS assumes normally distributed errors. Quantile regression does not.</a:t>
+            </a:r>
+          </a:p>
+        </p:txBody>
+      </p:sp>
+      <p:sp>
+        <p:nvSpPr>
+          <p:cNvPr id="3" name="Date Placeholder 2">
+            <a:extLst>
+              <a:ext uri="{FF2B5EF4-FFF2-40B4-BE49-F238E27FC236}">
+                <a16:creationId xmlns:a16="http://schemas.microsoft.com/office/drawing/2014/main" id="{2B7CE719-CBCD-333E-8FC3-B960F1FB758D}"/>
+              </a:ext>
+            </a:extLst>
+          </p:cNvPr>
+          <p:cNvSpPr>
+            <a:spLocks noGrp="1"/>
+          </p:cNvSpPr>
+          <p:nvPr>
+            <p:ph type="dt" sz="half" idx="10"/>
+          </p:nvPr>
+        </p:nvSpPr>
+        <p:spPr/>
+        <p:txBody>
+          <a:bodyPr/>
+          <a:lstStyle/>
+          <a:p>
+            <a:fld id="{A8AD868F-8409-4F04-87B4-D0383043B754}" type="datetime8">
+              <a:rPr lang="en-US" smtClean="0"/>
+              <a:t>6/27/2024 7:19 AM</a:t>
+            </a:fld>
+            <a:endParaRPr lang="en-US" dirty="0"/>
+          </a:p>
+        </p:txBody>
+      </p:sp>
+      <p:sp>
+        <p:nvSpPr>
+          <p:cNvPr id="4" name="Slide Number Placeholder 3">
+            <a:extLst>
+              <a:ext uri="{FF2B5EF4-FFF2-40B4-BE49-F238E27FC236}">
+                <a16:creationId xmlns:a16="http://schemas.microsoft.com/office/drawing/2014/main" id="{C85C919E-920D-ABA8-C512-F7D55D8B3B85}"/>
+              </a:ext>
+            </a:extLst>
+          </p:cNvPr>
+          <p:cNvSpPr>
+            <a:spLocks noGrp="1"/>
+          </p:cNvSpPr>
+          <p:nvPr>
+            <p:ph type="sldNum" sz="quarter" idx="12"/>
+          </p:nvPr>
+        </p:nvSpPr>
+        <p:spPr/>
+        <p:txBody>
+          <a:bodyPr/>
+          <a:lstStyle/>
+          <a:p>
+            <a:fld id="{6D22F896-40B5-4ADD-8801-0D06FADFA095}" type="slidenum">
+              <a:rPr lang="en-US" smtClean="0"/>
+              <a:t>46</a:t>
+            </a:fld>
+            <a:endParaRPr lang="en-US" dirty="0"/>
+          </a:p>
+        </p:txBody>
+      </p:sp>
+    </p:spTree>
+    <p:extLst>
+      <p:ext uri="{BB962C8B-B14F-4D97-AF65-F5344CB8AC3E}">
+        <p14:creationId xmlns:p14="http://schemas.microsoft.com/office/powerpoint/2010/main" val="4069154747"/>
+      </p:ext>
+    </p:extLst>
+  </p:cSld>
+  <p:clrMapOvr>
+    <a:masterClrMapping/>
+  </p:clrMapOvr>
+</p:sld>
+</file>
+
+<file path=ppt/slides/slide47.xml><?xml version="1.0" encoding="utf-8"?>
+<p:sld xmlns:a="http://schemas.openxmlformats.org/drawingml/2006/main" xmlns:r="http://schemas.openxmlformats.org/officeDocument/2006/relationships" xmlns:p="http://schemas.openxmlformats.org/presentationml/2006/main">
+  <p:cSld>
+    <p:spTree>
+      <p:nvGrpSpPr>
+        <p:cNvPr id="1" name=""/>
+        <p:cNvGrpSpPr/>
+        <p:nvPr/>
+      </p:nvGrpSpPr>
+      <p:grpSpPr>
+        <a:xfrm>
+          <a:off x="0" y="0"/>
+          <a:ext cx="0" cy="0"/>
+          <a:chOff x="0" y="0"/>
+          <a:chExt cx="0" cy="0"/>
+        </a:xfrm>
+      </p:grpSpPr>
+      <p:sp>
+        <p:nvSpPr>
+          <p:cNvPr id="2" name="Title 1">
+            <a:extLst>
+              <a:ext uri="{FF2B5EF4-FFF2-40B4-BE49-F238E27FC236}">
+                <a16:creationId xmlns:a16="http://schemas.microsoft.com/office/drawing/2014/main" id="{EB68B490-BCF0-4C36-80D5-86B59D568E72}"/>
+              </a:ext>
+            </a:extLst>
+          </p:cNvPr>
+          <p:cNvSpPr>
+            <a:spLocks noGrp="1"/>
+          </p:cNvSpPr>
+          <p:nvPr>
+            <p:ph type="title"/>
+          </p:nvPr>
+        </p:nvSpPr>
+        <p:spPr>
+          <a:xfrm>
+            <a:off x="838200" y="365126"/>
+            <a:ext cx="10515600" cy="722270"/>
+          </a:xfrm>
+        </p:spPr>
+        <p:txBody>
+          <a:bodyPr/>
+          <a:lstStyle/>
+          <a:p>
+            <a:r>
+              <a:rPr lang="en-US" dirty="0">
+                <a:latin typeface="Amasis MT Pro Black" panose="02040A04050005020304" pitchFamily="18" charset="0"/>
+              </a:rPr>
+              <a:t>Quantile regression (q=0.5)</a:t>
+            </a:r>
+          </a:p>
+        </p:txBody>
+      </p:sp>
+      <p:sp>
+        <p:nvSpPr>
+          <p:cNvPr id="3" name="Date Placeholder 2">
+            <a:extLst>
+              <a:ext uri="{FF2B5EF4-FFF2-40B4-BE49-F238E27FC236}">
+                <a16:creationId xmlns:a16="http://schemas.microsoft.com/office/drawing/2014/main" id="{2B7CE719-CBCD-333E-8FC3-B960F1FB758D}"/>
+              </a:ext>
+            </a:extLst>
+          </p:cNvPr>
+          <p:cNvSpPr>
+            <a:spLocks noGrp="1"/>
+          </p:cNvSpPr>
+          <p:nvPr>
+            <p:ph type="dt" sz="half" idx="10"/>
+          </p:nvPr>
+        </p:nvSpPr>
+        <p:spPr/>
+        <p:txBody>
+          <a:bodyPr/>
+          <a:lstStyle/>
+          <a:p>
+            <a:fld id="{A8AD868F-8409-4F04-87B4-D0383043B754}" type="datetime8">
+              <a:rPr lang="en-US" smtClean="0"/>
+              <a:t>6/27/2024 7:13 AM</a:t>
+            </a:fld>
+            <a:endParaRPr lang="en-US" dirty="0"/>
+          </a:p>
+        </p:txBody>
+      </p:sp>
+      <p:sp>
+        <p:nvSpPr>
+          <p:cNvPr id="4" name="Slide Number Placeholder 3">
+            <a:extLst>
+              <a:ext uri="{FF2B5EF4-FFF2-40B4-BE49-F238E27FC236}">
+                <a16:creationId xmlns:a16="http://schemas.microsoft.com/office/drawing/2014/main" id="{C85C919E-920D-ABA8-C512-F7D55D8B3B85}"/>
+              </a:ext>
+            </a:extLst>
+          </p:cNvPr>
+          <p:cNvSpPr>
+            <a:spLocks noGrp="1"/>
+          </p:cNvSpPr>
+          <p:nvPr>
+            <p:ph type="sldNum" sz="quarter" idx="12"/>
+          </p:nvPr>
+        </p:nvSpPr>
+        <p:spPr/>
+        <p:txBody>
+          <a:bodyPr/>
+          <a:lstStyle/>
+          <a:p>
+            <a:fld id="{6D22F896-40B5-4ADD-8801-0D06FADFA095}" type="slidenum">
+              <a:rPr lang="en-US" smtClean="0"/>
+              <a:t>47</a:t>
+            </a:fld>
+            <a:endParaRPr lang="en-US" dirty="0"/>
+          </a:p>
+        </p:txBody>
+      </p:sp>
+      <p:sp>
+        <p:nvSpPr>
+          <p:cNvPr id="7" name="Content Placeholder 2">
+            <a:extLst>
+              <a:ext uri="{FF2B5EF4-FFF2-40B4-BE49-F238E27FC236}">
+                <a16:creationId xmlns:a16="http://schemas.microsoft.com/office/drawing/2014/main" id="{D6090756-9E00-68EC-B6E5-6A72DDD201F7}"/>
+              </a:ext>
+            </a:extLst>
+          </p:cNvPr>
+          <p:cNvSpPr>
+            <a:spLocks noGrp="1"/>
+          </p:cNvSpPr>
+          <p:nvPr>
+            <p:ph idx="1"/>
+          </p:nvPr>
+        </p:nvSpPr>
+        <p:spPr>
+          <a:xfrm>
+            <a:off x="8994058" y="1389932"/>
+            <a:ext cx="2804652" cy="645345"/>
+          </a:xfrm>
+          <a:ln w="19050">
+            <a:solidFill>
+              <a:srgbClr val="0070C0"/>
+            </a:solidFill>
+          </a:ln>
+        </p:spPr>
+        <p:txBody>
+          <a:bodyPr>
+            <a:normAutofit/>
+          </a:bodyPr>
+          <a:lstStyle/>
+          <a:p>
+            <a:pPr marL="0" indent="0">
+              <a:buNone/>
+            </a:pPr>
+            <a:r>
+              <a:rPr lang="en-US" dirty="0">
+                <a:solidFill>
+                  <a:srgbClr val="374151"/>
+                </a:solidFill>
+                <a:latin typeface="Amasis MT Pro" panose="02040504050005020304" pitchFamily="18" charset="0"/>
+              </a:rPr>
+              <a:t>RMSE = 0.2072</a:t>
+            </a:r>
+          </a:p>
+        </p:txBody>
+      </p:sp>
+      <p:pic>
+        <p:nvPicPr>
+          <p:cNvPr id="6" name="Picture 5">
+            <a:extLst>
+              <a:ext uri="{FF2B5EF4-FFF2-40B4-BE49-F238E27FC236}">
+                <a16:creationId xmlns:a16="http://schemas.microsoft.com/office/drawing/2014/main" id="{D725903E-8D72-8F08-D269-D2CB25018BB4}"/>
+              </a:ext>
+            </a:extLst>
+          </p:cNvPr>
+          <p:cNvPicPr>
+            <a:picLocks noChangeAspect="1"/>
+          </p:cNvPicPr>
+          <p:nvPr/>
+        </p:nvPicPr>
+        <p:blipFill>
+          <a:blip r:embed="rId2"/>
+          <a:stretch>
+            <a:fillRect/>
+          </a:stretch>
+        </p:blipFill>
+        <p:spPr>
+          <a:xfrm>
+            <a:off x="282005" y="1389932"/>
+            <a:ext cx="8328595" cy="5006785"/>
+          </a:xfrm>
+          <a:prstGeom prst="rect">
+            <a:avLst/>
+          </a:prstGeom>
+        </p:spPr>
+      </p:pic>
+    </p:spTree>
+    <p:extLst>
+      <p:ext uri="{BB962C8B-B14F-4D97-AF65-F5344CB8AC3E}">
+        <p14:creationId xmlns:p14="http://schemas.microsoft.com/office/powerpoint/2010/main" val="2502950457"/>
+      </p:ext>
+    </p:extLst>
+  </p:cSld>
+  <p:clrMapOvr>
+    <a:masterClrMapping/>
+  </p:clrMapOvr>
+</p:sld>
+</file>
+
+<file path=ppt/slides/slide48.xml><?xml version="1.0" encoding="utf-8"?>
+<p:sld xmlns:a="http://schemas.openxmlformats.org/drawingml/2006/main" xmlns:r="http://schemas.openxmlformats.org/officeDocument/2006/relationships" xmlns:p="http://schemas.openxmlformats.org/presentationml/2006/main">
+  <p:cSld>
+    <p:spTree>
+      <p:nvGrpSpPr>
+        <p:cNvPr id="1" name=""/>
+        <p:cNvGrpSpPr/>
+        <p:nvPr/>
+      </p:nvGrpSpPr>
+      <p:grpSpPr>
+        <a:xfrm>
+          <a:off x="0" y="0"/>
+          <a:ext cx="0" cy="0"/>
+          <a:chOff x="0" y="0"/>
+          <a:chExt cx="0" cy="0"/>
+        </a:xfrm>
+      </p:grpSpPr>
+      <p:sp>
+        <p:nvSpPr>
+          <p:cNvPr id="2" name="Title 1">
+            <a:extLst>
+              <a:ext uri="{FF2B5EF4-FFF2-40B4-BE49-F238E27FC236}">
+                <a16:creationId xmlns:a16="http://schemas.microsoft.com/office/drawing/2014/main" id="{EB68B490-BCF0-4C36-80D5-86B59D568E72}"/>
+              </a:ext>
+            </a:extLst>
+          </p:cNvPr>
+          <p:cNvSpPr>
+            <a:spLocks noGrp="1"/>
+          </p:cNvSpPr>
+          <p:nvPr>
+            <p:ph type="title"/>
+          </p:nvPr>
+        </p:nvSpPr>
+        <p:spPr>
+          <a:xfrm>
+            <a:off x="838200" y="365126"/>
+            <a:ext cx="10515600" cy="722270"/>
+          </a:xfrm>
+        </p:spPr>
+        <p:txBody>
+          <a:bodyPr/>
+          <a:lstStyle/>
+          <a:p>
+            <a:r>
+              <a:rPr lang="en-US" dirty="0">
+                <a:latin typeface="Amasis MT Pro Black" panose="02040A04050005020304" pitchFamily="18" charset="0"/>
+              </a:rPr>
+              <a:t>Quantile regression (q=0.1)</a:t>
+            </a:r>
+          </a:p>
+        </p:txBody>
+      </p:sp>
+      <p:sp>
+        <p:nvSpPr>
+          <p:cNvPr id="3" name="Date Placeholder 2">
+            <a:extLst>
+              <a:ext uri="{FF2B5EF4-FFF2-40B4-BE49-F238E27FC236}">
+                <a16:creationId xmlns:a16="http://schemas.microsoft.com/office/drawing/2014/main" id="{2B7CE719-CBCD-333E-8FC3-B960F1FB758D}"/>
+              </a:ext>
+            </a:extLst>
+          </p:cNvPr>
+          <p:cNvSpPr>
+            <a:spLocks noGrp="1"/>
+          </p:cNvSpPr>
+          <p:nvPr>
+            <p:ph type="dt" sz="half" idx="10"/>
+          </p:nvPr>
+        </p:nvSpPr>
+        <p:spPr/>
+        <p:txBody>
+          <a:bodyPr/>
+          <a:lstStyle/>
+          <a:p>
+            <a:fld id="{A8AD868F-8409-4F04-87B4-D0383043B754}" type="datetime8">
+              <a:rPr lang="en-US" smtClean="0"/>
+              <a:t>6/27/2024 7:26 AM</a:t>
+            </a:fld>
+            <a:endParaRPr lang="en-US" dirty="0"/>
+          </a:p>
+        </p:txBody>
+      </p:sp>
+      <p:sp>
+        <p:nvSpPr>
+          <p:cNvPr id="4" name="Slide Number Placeholder 3">
+            <a:extLst>
+              <a:ext uri="{FF2B5EF4-FFF2-40B4-BE49-F238E27FC236}">
+                <a16:creationId xmlns:a16="http://schemas.microsoft.com/office/drawing/2014/main" id="{C85C919E-920D-ABA8-C512-F7D55D8B3B85}"/>
+              </a:ext>
+            </a:extLst>
+          </p:cNvPr>
+          <p:cNvSpPr>
+            <a:spLocks noGrp="1"/>
+          </p:cNvSpPr>
+          <p:nvPr>
+            <p:ph type="sldNum" sz="quarter" idx="12"/>
+          </p:nvPr>
+        </p:nvSpPr>
+        <p:spPr/>
+        <p:txBody>
+          <a:bodyPr/>
+          <a:lstStyle/>
+          <a:p>
+            <a:fld id="{6D22F896-40B5-4ADD-8801-0D06FADFA095}" type="slidenum">
+              <a:rPr lang="en-US" smtClean="0"/>
+              <a:t>48</a:t>
+            </a:fld>
+            <a:endParaRPr lang="en-US" dirty="0"/>
+          </a:p>
+        </p:txBody>
+      </p:sp>
+      <p:pic>
+        <p:nvPicPr>
+          <p:cNvPr id="8" name="Picture 7">
+            <a:extLst>
+              <a:ext uri="{FF2B5EF4-FFF2-40B4-BE49-F238E27FC236}">
+                <a16:creationId xmlns:a16="http://schemas.microsoft.com/office/drawing/2014/main" id="{536EB044-ABFA-A981-666B-666F03A97EC8}"/>
+              </a:ext>
+            </a:extLst>
+          </p:cNvPr>
+          <p:cNvPicPr>
+            <a:picLocks noChangeAspect="1"/>
+          </p:cNvPicPr>
+          <p:nvPr/>
+        </p:nvPicPr>
+        <p:blipFill>
+          <a:blip r:embed="rId2"/>
+          <a:stretch>
+            <a:fillRect/>
+          </a:stretch>
+        </p:blipFill>
+        <p:spPr>
+          <a:xfrm>
+            <a:off x="1599049" y="1132173"/>
+            <a:ext cx="8993901" cy="5406739"/>
+          </a:xfrm>
+          <a:prstGeom prst="rect">
+            <a:avLst/>
+          </a:prstGeom>
+        </p:spPr>
+      </p:pic>
+    </p:spTree>
+    <p:extLst>
+      <p:ext uri="{BB962C8B-B14F-4D97-AF65-F5344CB8AC3E}">
+        <p14:creationId xmlns:p14="http://schemas.microsoft.com/office/powerpoint/2010/main" val="1373457081"/>
+      </p:ext>
+    </p:extLst>
+  </p:cSld>
+  <p:clrMapOvr>
+    <a:masterClrMapping/>
+  </p:clrMapOvr>
+</p:sld>
+</file>
+
+<file path=ppt/slides/slide49.xml><?xml version="1.0" encoding="utf-8"?>
+<p:sld xmlns:a="http://schemas.openxmlformats.org/drawingml/2006/main" xmlns:r="http://schemas.openxmlformats.org/officeDocument/2006/relationships" xmlns:p="http://schemas.openxmlformats.org/presentationml/2006/main">
+  <p:cSld>
+    <p:spTree>
+      <p:nvGrpSpPr>
+        <p:cNvPr id="1" name=""/>
+        <p:cNvGrpSpPr/>
+        <p:nvPr/>
+      </p:nvGrpSpPr>
+      <p:grpSpPr>
+        <a:xfrm>
+          <a:off x="0" y="0"/>
+          <a:ext cx="0" cy="0"/>
+          <a:chOff x="0" y="0"/>
+          <a:chExt cx="0" cy="0"/>
+        </a:xfrm>
+      </p:grpSpPr>
+      <p:sp>
+        <p:nvSpPr>
+          <p:cNvPr id="2" name="Title 1">
+            <a:extLst>
+              <a:ext uri="{FF2B5EF4-FFF2-40B4-BE49-F238E27FC236}">
+                <a16:creationId xmlns:a16="http://schemas.microsoft.com/office/drawing/2014/main" id="{EB68B490-BCF0-4C36-80D5-86B59D568E72}"/>
+              </a:ext>
+            </a:extLst>
+          </p:cNvPr>
+          <p:cNvSpPr>
+            <a:spLocks noGrp="1"/>
+          </p:cNvSpPr>
+          <p:nvPr>
+            <p:ph type="title"/>
+          </p:nvPr>
+        </p:nvSpPr>
+        <p:spPr>
+          <a:xfrm>
+            <a:off x="838200" y="365126"/>
+            <a:ext cx="10515600" cy="722270"/>
+          </a:xfrm>
+        </p:spPr>
+        <p:txBody>
+          <a:bodyPr/>
+          <a:lstStyle/>
+          <a:p>
+            <a:r>
+              <a:rPr lang="en-US" dirty="0">
+                <a:latin typeface="Amasis MT Pro Black" panose="02040A04050005020304" pitchFamily="18" charset="0"/>
+              </a:rPr>
+              <a:t>Quantile regression (q=0.9)</a:t>
+            </a:r>
+          </a:p>
+        </p:txBody>
+      </p:sp>
+      <p:sp>
+        <p:nvSpPr>
+          <p:cNvPr id="3" name="Date Placeholder 2">
+            <a:extLst>
+              <a:ext uri="{FF2B5EF4-FFF2-40B4-BE49-F238E27FC236}">
+                <a16:creationId xmlns:a16="http://schemas.microsoft.com/office/drawing/2014/main" id="{2B7CE719-CBCD-333E-8FC3-B960F1FB758D}"/>
+              </a:ext>
+            </a:extLst>
+          </p:cNvPr>
+          <p:cNvSpPr>
+            <a:spLocks noGrp="1"/>
+          </p:cNvSpPr>
+          <p:nvPr>
+            <p:ph type="dt" sz="half" idx="10"/>
+          </p:nvPr>
+        </p:nvSpPr>
+        <p:spPr/>
+        <p:txBody>
+          <a:bodyPr/>
+          <a:lstStyle/>
+          <a:p>
+            <a:fld id="{A8AD868F-8409-4F04-87B4-D0383043B754}" type="datetime8">
+              <a:rPr lang="en-US" smtClean="0"/>
+              <a:t>6/27/2024 7:27 AM</a:t>
+            </a:fld>
+            <a:endParaRPr lang="en-US" dirty="0"/>
+          </a:p>
+        </p:txBody>
+      </p:sp>
+      <p:sp>
+        <p:nvSpPr>
+          <p:cNvPr id="4" name="Slide Number Placeholder 3">
+            <a:extLst>
+              <a:ext uri="{FF2B5EF4-FFF2-40B4-BE49-F238E27FC236}">
+                <a16:creationId xmlns:a16="http://schemas.microsoft.com/office/drawing/2014/main" id="{C85C919E-920D-ABA8-C512-F7D55D8B3B85}"/>
+              </a:ext>
+            </a:extLst>
+          </p:cNvPr>
+          <p:cNvSpPr>
+            <a:spLocks noGrp="1"/>
+          </p:cNvSpPr>
+          <p:nvPr>
+            <p:ph type="sldNum" sz="quarter" idx="12"/>
+          </p:nvPr>
+        </p:nvSpPr>
+        <p:spPr/>
+        <p:txBody>
+          <a:bodyPr/>
+          <a:lstStyle/>
+          <a:p>
+            <a:fld id="{6D22F896-40B5-4ADD-8801-0D06FADFA095}" type="slidenum">
+              <a:rPr lang="en-US" smtClean="0"/>
+              <a:t>49</a:t>
+            </a:fld>
+            <a:endParaRPr lang="en-US" dirty="0"/>
+          </a:p>
+        </p:txBody>
+      </p:sp>
+      <p:pic>
+        <p:nvPicPr>
+          <p:cNvPr id="6" name="Picture 5">
+            <a:extLst>
+              <a:ext uri="{FF2B5EF4-FFF2-40B4-BE49-F238E27FC236}">
+                <a16:creationId xmlns:a16="http://schemas.microsoft.com/office/drawing/2014/main" id="{DB425156-F5DD-6AE3-B7EB-EDBC2741E3DA}"/>
+              </a:ext>
+            </a:extLst>
+          </p:cNvPr>
+          <p:cNvPicPr>
+            <a:picLocks noChangeAspect="1"/>
+          </p:cNvPicPr>
+          <p:nvPr/>
+        </p:nvPicPr>
+        <p:blipFill>
+          <a:blip r:embed="rId2"/>
+          <a:stretch>
+            <a:fillRect/>
+          </a:stretch>
+        </p:blipFill>
+        <p:spPr>
+          <a:xfrm>
+            <a:off x="1528864" y="1230352"/>
+            <a:ext cx="9134272" cy="5491123"/>
+          </a:xfrm>
+          <a:prstGeom prst="rect">
+            <a:avLst/>
+          </a:prstGeom>
+        </p:spPr>
+      </p:pic>
+    </p:spTree>
+    <p:extLst>
+      <p:ext uri="{BB962C8B-B14F-4D97-AF65-F5344CB8AC3E}">
+        <p14:creationId xmlns:p14="http://schemas.microsoft.com/office/powerpoint/2010/main" val="2521496325"/>
+      </p:ext>
+    </p:extLst>
+  </p:cSld>
+  <p:clrMapOvr>
+    <a:masterClrMapping/>
   </p:clrMapOvr>
 </p:sld>
 </file>
@@ -13989,7 +14797,7 @@
           <a:p>
             <a:fld id="{121A92AE-D6FC-4EA3-AB09-8AEC31FD403C}" type="datetime8">
               <a:rPr lang="en-US" smtClean="0"/>
-              <a:t>6/26/2024 6:38 PM</a:t>
+              <a:t>6/27/2024 7:12 AM</a:t>
             </a:fld>
             <a:endParaRPr lang="en-US" dirty="0"/>
           </a:p>
@@ -14028,6 +14836,473 @@
     <p:extLst>
       <p:ext uri="{BB962C8B-B14F-4D97-AF65-F5344CB8AC3E}">
         <p14:creationId xmlns:p14="http://schemas.microsoft.com/office/powerpoint/2010/main" val="2195438493"/>
+      </p:ext>
+    </p:extLst>
+  </p:cSld>
+  <p:clrMapOvr>
+    <a:overrideClrMapping bg1="dk1" tx1="lt1" bg2="dk2" tx2="lt2" accent1="accent1" accent2="accent2" accent3="accent3" accent4="accent4" accent5="accent5" accent6="accent6" hlink="hlink" folHlink="folHlink"/>
+  </p:clrMapOvr>
+</p:sld>
+</file>
+
+<file path=ppt/slides/slide50.xml><?xml version="1.0" encoding="utf-8"?>
+<p:sld xmlns:a="http://schemas.openxmlformats.org/drawingml/2006/main" xmlns:r="http://schemas.openxmlformats.org/officeDocument/2006/relationships" xmlns:p="http://schemas.openxmlformats.org/presentationml/2006/main">
+  <p:cSld>
+    <p:bg>
+      <p:bgPr>
+        <a:solidFill>
+          <a:schemeClr val="bg1">
+            <a:tint val="95000"/>
+            <a:satMod val="170000"/>
+          </a:schemeClr>
+        </a:solidFill>
+        <a:effectLst/>
+      </p:bgPr>
+    </p:bg>
+    <p:spTree>
+      <p:nvGrpSpPr>
+        <p:cNvPr id="1" name=""/>
+        <p:cNvGrpSpPr/>
+        <p:nvPr/>
+      </p:nvGrpSpPr>
+      <p:grpSpPr>
+        <a:xfrm>
+          <a:off x="0" y="0"/>
+          <a:ext cx="0" cy="0"/>
+          <a:chOff x="0" y="0"/>
+          <a:chExt cx="0" cy="0"/>
+        </a:xfrm>
+      </p:grpSpPr>
+      <p:sp>
+        <p:nvSpPr>
+          <p:cNvPr id="7" name="Freeform: Shape 6">
+            <a:extLst>
+              <a:ext uri="{FF2B5EF4-FFF2-40B4-BE49-F238E27FC236}">
+                <a16:creationId xmlns:a16="http://schemas.microsoft.com/office/drawing/2014/main" id="{66B332A4-D438-4773-A77F-5ED49A448D9D}"/>
+              </a:ext>
+              <a:ext uri="{C183D7F6-B498-43B3-948B-1728B52AA6E4}">
+                <adec:decorative xmlns:adec="http://schemas.microsoft.com/office/drawing/2017/decorative" val="1"/>
+              </a:ext>
+            </a:extLst>
+          </p:cNvPr>
+          <p:cNvSpPr>
+            <a:spLocks noGrp="1" noRot="1" noChangeAspect="1" noMove="1" noResize="1" noEditPoints="1" noAdjustHandles="1" noChangeArrowheads="1" noChangeShapeType="1" noTextEdit="1"/>
+          </p:cNvSpPr>
+          <p:nvPr>
+            <p:extLst>
+              <p:ext uri="{386F3935-93C4-4BCD-93E2-E3B085C9AB24}">
+                <p16:designElem xmlns:p16="http://schemas.microsoft.com/office/powerpoint/2015/main" val="1"/>
+              </p:ext>
+            </p:extLst>
+          </p:nvPr>
+        </p:nvSpPr>
+        <p:spPr>
+          <a:xfrm>
+            <a:off x="1953768" y="0"/>
+            <a:ext cx="8284464" cy="6858000"/>
+          </a:xfrm>
+          <a:custGeom>
+            <a:avLst/>
+            <a:gdLst>
+              <a:gd name="connsiteX0" fmla="*/ 1818109 w 8284464"/>
+              <a:gd name="connsiteY0" fmla="*/ 0 h 6858000"/>
+              <a:gd name="connsiteX1" fmla="*/ 6466355 w 8284464"/>
+              <a:gd name="connsiteY1" fmla="*/ 0 h 6858000"/>
+              <a:gd name="connsiteX2" fmla="*/ 6620596 w 8284464"/>
+              <a:gd name="connsiteY2" fmla="*/ 109683 h 6858000"/>
+              <a:gd name="connsiteX3" fmla="*/ 8284464 w 8284464"/>
+              <a:gd name="connsiteY3" fmla="*/ 3429000 h 6858000"/>
+              <a:gd name="connsiteX4" fmla="*/ 6620596 w 8284464"/>
+              <a:gd name="connsiteY4" fmla="*/ 6748318 h 6858000"/>
+              <a:gd name="connsiteX5" fmla="*/ 6466355 w 8284464"/>
+              <a:gd name="connsiteY5" fmla="*/ 6858000 h 6858000"/>
+              <a:gd name="connsiteX6" fmla="*/ 1818109 w 8284464"/>
+              <a:gd name="connsiteY6" fmla="*/ 6858000 h 6858000"/>
+              <a:gd name="connsiteX7" fmla="*/ 1663869 w 8284464"/>
+              <a:gd name="connsiteY7" fmla="*/ 6748318 h 6858000"/>
+              <a:gd name="connsiteX8" fmla="*/ 0 w 8284464"/>
+              <a:gd name="connsiteY8" fmla="*/ 3429000 h 6858000"/>
+              <a:gd name="connsiteX9" fmla="*/ 1663869 w 8284464"/>
+              <a:gd name="connsiteY9" fmla="*/ 109683 h 6858000"/>
+            </a:gdLst>
+            <a:ahLst/>
+            <a:cxnLst>
+              <a:cxn ang="0">
+                <a:pos x="connsiteX0" y="connsiteY0"/>
+              </a:cxn>
+              <a:cxn ang="0">
+                <a:pos x="connsiteX1" y="connsiteY1"/>
+              </a:cxn>
+              <a:cxn ang="0">
+                <a:pos x="connsiteX2" y="connsiteY2"/>
+              </a:cxn>
+              <a:cxn ang="0">
+                <a:pos x="connsiteX3" y="connsiteY3"/>
+              </a:cxn>
+              <a:cxn ang="0">
+                <a:pos x="connsiteX4" y="connsiteY4"/>
+              </a:cxn>
+              <a:cxn ang="0">
+                <a:pos x="connsiteX5" y="connsiteY5"/>
+              </a:cxn>
+              <a:cxn ang="0">
+                <a:pos x="connsiteX6" y="connsiteY6"/>
+              </a:cxn>
+              <a:cxn ang="0">
+                <a:pos x="connsiteX7" y="connsiteY7"/>
+              </a:cxn>
+              <a:cxn ang="0">
+                <a:pos x="connsiteX8" y="connsiteY8"/>
+              </a:cxn>
+              <a:cxn ang="0">
+                <a:pos x="connsiteX9" y="connsiteY9"/>
+              </a:cxn>
+            </a:cxnLst>
+            <a:rect l="l" t="t" r="r" b="b"/>
+            <a:pathLst>
+              <a:path w="8284464" h="6858000">
+                <a:moveTo>
+                  <a:pt x="1818109" y="0"/>
+                </a:moveTo>
+                <a:lnTo>
+                  <a:pt x="6466355" y="0"/>
+                </a:lnTo>
+                <a:lnTo>
+                  <a:pt x="6620596" y="109683"/>
+                </a:lnTo>
+                <a:cubicBezTo>
+                  <a:pt x="7630666" y="865069"/>
+                  <a:pt x="8284464" y="2070683"/>
+                  <a:pt x="8284464" y="3429000"/>
+                </a:cubicBezTo>
+                <a:cubicBezTo>
+                  <a:pt x="8284464" y="4787317"/>
+                  <a:pt x="7630666" y="5992931"/>
+                  <a:pt x="6620596" y="6748318"/>
+                </a:cubicBezTo>
+                <a:lnTo>
+                  <a:pt x="6466355" y="6858000"/>
+                </a:lnTo>
+                <a:lnTo>
+                  <a:pt x="1818109" y="6858000"/>
+                </a:lnTo>
+                <a:lnTo>
+                  <a:pt x="1663869" y="6748318"/>
+                </a:lnTo>
+                <a:cubicBezTo>
+                  <a:pt x="653798" y="5992931"/>
+                  <a:pt x="0" y="4787317"/>
+                  <a:pt x="0" y="3429000"/>
+                </a:cubicBezTo>
+                <a:cubicBezTo>
+                  <a:pt x="0" y="2070683"/>
+                  <a:pt x="653798" y="865069"/>
+                  <a:pt x="1663869" y="109683"/>
+                </a:cubicBezTo>
+                <a:close/>
+              </a:path>
+            </a:pathLst>
+          </a:custGeom>
+          <a:solidFill>
+            <a:srgbClr val="FFFFFF">
+              <a:alpha val="80000"/>
+            </a:srgbClr>
+          </a:solidFill>
+          <a:ln>
+            <a:noFill/>
+          </a:ln>
+        </p:spPr>
+        <p:style>
+          <a:lnRef idx="2">
+            <a:schemeClr val="accent1">
+              <a:shade val="50000"/>
+            </a:schemeClr>
+          </a:lnRef>
+          <a:fillRef idx="1">
+            <a:schemeClr val="accent1"/>
+          </a:fillRef>
+          <a:effectRef idx="0">
+            <a:schemeClr val="accent1"/>
+          </a:effectRef>
+          <a:fontRef idx="minor">
+            <a:schemeClr val="lt1"/>
+          </a:fontRef>
+        </p:style>
+        <p:txBody>
+          <a:bodyPr wrap="square" rtlCol="0" anchor="ctr">
+            <a:noAutofit/>
+          </a:bodyPr>
+          <a:lstStyle/>
+          <a:p>
+            <a:pPr algn="ctr"/>
+            <a:endParaRPr lang="en-US"/>
+          </a:p>
+        </p:txBody>
+      </p:sp>
+      <p:sp>
+        <p:nvSpPr>
+          <p:cNvPr id="9" name="Freeform: Shape 8">
+            <a:extLst>
+              <a:ext uri="{FF2B5EF4-FFF2-40B4-BE49-F238E27FC236}">
+                <a16:creationId xmlns:a16="http://schemas.microsoft.com/office/drawing/2014/main" id="{DF9AD32D-FF05-44F4-BD4D-9CEE89B71EB9}"/>
+              </a:ext>
+              <a:ext uri="{C183D7F6-B498-43B3-948B-1728B52AA6E4}">
+                <adec:decorative xmlns:adec="http://schemas.microsoft.com/office/drawing/2017/decorative" val="1"/>
+              </a:ext>
+            </a:extLst>
+          </p:cNvPr>
+          <p:cNvSpPr>
+            <a:spLocks noGrp="1" noRot="1" noChangeAspect="1" noMove="1" noResize="1" noEditPoints="1" noAdjustHandles="1" noChangeArrowheads="1" noChangeShapeType="1" noTextEdit="1"/>
+          </p:cNvSpPr>
+          <p:nvPr>
+            <p:extLst>
+              <p:ext uri="{386F3935-93C4-4BCD-93E2-E3B085C9AB24}">
+                <p16:designElem xmlns:p16="http://schemas.microsoft.com/office/powerpoint/2015/main" val="1"/>
+              </p:ext>
+            </p:extLst>
+          </p:nvPr>
+        </p:nvSpPr>
+        <p:spPr>
+          <a:xfrm>
+            <a:off x="2118360" y="0"/>
+            <a:ext cx="7955280" cy="6858000"/>
+          </a:xfrm>
+          <a:custGeom>
+            <a:avLst/>
+            <a:gdLst>
+              <a:gd name="connsiteX0" fmla="*/ 1962423 w 7955280"/>
+              <a:gd name="connsiteY0" fmla="*/ 0 h 6858000"/>
+              <a:gd name="connsiteX1" fmla="*/ 5992858 w 7955280"/>
+              <a:gd name="connsiteY1" fmla="*/ 0 h 6858000"/>
+              <a:gd name="connsiteX2" fmla="*/ 6040191 w 7955280"/>
+              <a:gd name="connsiteY2" fmla="*/ 27216 h 6858000"/>
+              <a:gd name="connsiteX3" fmla="*/ 7955280 w 7955280"/>
+              <a:gd name="connsiteY3" fmla="*/ 3429000 h 6858000"/>
+              <a:gd name="connsiteX4" fmla="*/ 6040191 w 7955280"/>
+              <a:gd name="connsiteY4" fmla="*/ 6830784 h 6858000"/>
+              <a:gd name="connsiteX5" fmla="*/ 5992858 w 7955280"/>
+              <a:gd name="connsiteY5" fmla="*/ 6858000 h 6858000"/>
+              <a:gd name="connsiteX6" fmla="*/ 1962423 w 7955280"/>
+              <a:gd name="connsiteY6" fmla="*/ 6858000 h 6858000"/>
+              <a:gd name="connsiteX7" fmla="*/ 1915089 w 7955280"/>
+              <a:gd name="connsiteY7" fmla="*/ 6830784 h 6858000"/>
+              <a:gd name="connsiteX8" fmla="*/ 0 w 7955280"/>
+              <a:gd name="connsiteY8" fmla="*/ 3429000 h 6858000"/>
+              <a:gd name="connsiteX9" fmla="*/ 1915089 w 7955280"/>
+              <a:gd name="connsiteY9" fmla="*/ 27216 h 6858000"/>
+            </a:gdLst>
+            <a:ahLst/>
+            <a:cxnLst>
+              <a:cxn ang="0">
+                <a:pos x="connsiteX0" y="connsiteY0"/>
+              </a:cxn>
+              <a:cxn ang="0">
+                <a:pos x="connsiteX1" y="connsiteY1"/>
+              </a:cxn>
+              <a:cxn ang="0">
+                <a:pos x="connsiteX2" y="connsiteY2"/>
+              </a:cxn>
+              <a:cxn ang="0">
+                <a:pos x="connsiteX3" y="connsiteY3"/>
+              </a:cxn>
+              <a:cxn ang="0">
+                <a:pos x="connsiteX4" y="connsiteY4"/>
+              </a:cxn>
+              <a:cxn ang="0">
+                <a:pos x="connsiteX5" y="connsiteY5"/>
+              </a:cxn>
+              <a:cxn ang="0">
+                <a:pos x="connsiteX6" y="connsiteY6"/>
+              </a:cxn>
+              <a:cxn ang="0">
+                <a:pos x="connsiteX7" y="connsiteY7"/>
+              </a:cxn>
+              <a:cxn ang="0">
+                <a:pos x="connsiteX8" y="connsiteY8"/>
+              </a:cxn>
+              <a:cxn ang="0">
+                <a:pos x="connsiteX9" y="connsiteY9"/>
+              </a:cxn>
+            </a:cxnLst>
+            <a:rect l="l" t="t" r="r" b="b"/>
+            <a:pathLst>
+              <a:path w="7955280" h="6858000">
+                <a:moveTo>
+                  <a:pt x="1962423" y="0"/>
+                </a:moveTo>
+                <a:lnTo>
+                  <a:pt x="5992858" y="0"/>
+                </a:lnTo>
+                <a:lnTo>
+                  <a:pt x="6040191" y="27216"/>
+                </a:lnTo>
+                <a:cubicBezTo>
+                  <a:pt x="7188332" y="724844"/>
+                  <a:pt x="7955280" y="1987357"/>
+                  <a:pt x="7955280" y="3429000"/>
+                </a:cubicBezTo>
+                <a:cubicBezTo>
+                  <a:pt x="7955280" y="4870644"/>
+                  <a:pt x="7188332" y="6133157"/>
+                  <a:pt x="6040191" y="6830784"/>
+                </a:cubicBezTo>
+                <a:lnTo>
+                  <a:pt x="5992858" y="6858000"/>
+                </a:lnTo>
+                <a:lnTo>
+                  <a:pt x="1962423" y="6858000"/>
+                </a:lnTo>
+                <a:lnTo>
+                  <a:pt x="1915089" y="6830784"/>
+                </a:lnTo>
+                <a:cubicBezTo>
+                  <a:pt x="766948" y="6133157"/>
+                  <a:pt x="0" y="4870644"/>
+                  <a:pt x="0" y="3429000"/>
+                </a:cubicBezTo>
+                <a:cubicBezTo>
+                  <a:pt x="0" y="1987357"/>
+                  <a:pt x="766948" y="724844"/>
+                  <a:pt x="1915089" y="27216"/>
+                </a:cubicBezTo>
+                <a:close/>
+              </a:path>
+            </a:pathLst>
+          </a:custGeom>
+          <a:solidFill>
+            <a:schemeClr val="tx1"/>
+          </a:solidFill>
+          <a:ln>
+            <a:noFill/>
+          </a:ln>
+        </p:spPr>
+        <p:style>
+          <a:lnRef idx="2">
+            <a:schemeClr val="accent1">
+              <a:shade val="50000"/>
+            </a:schemeClr>
+          </a:lnRef>
+          <a:fillRef idx="1">
+            <a:schemeClr val="accent1"/>
+          </a:fillRef>
+          <a:effectRef idx="0">
+            <a:schemeClr val="accent1"/>
+          </a:effectRef>
+          <a:fontRef idx="minor">
+            <a:schemeClr val="lt1"/>
+          </a:fontRef>
+        </p:style>
+        <p:txBody>
+          <a:bodyPr wrap="square" rtlCol="0" anchor="ctr">
+            <a:noAutofit/>
+          </a:bodyPr>
+          <a:lstStyle/>
+          <a:p>
+            <a:pPr algn="ctr"/>
+            <a:endParaRPr lang="en-US"/>
+          </a:p>
+        </p:txBody>
+      </p:sp>
+      <p:sp>
+        <p:nvSpPr>
+          <p:cNvPr id="2" name="Title 1"/>
+          <p:cNvSpPr>
+            <a:spLocks noGrp="1"/>
+          </p:cNvSpPr>
+          <p:nvPr>
+            <p:ph type="title"/>
+          </p:nvPr>
+        </p:nvSpPr>
+        <p:spPr>
+          <a:xfrm>
+            <a:off x="2555631" y="1441938"/>
+            <a:ext cx="7080738" cy="3974124"/>
+          </a:xfrm>
+        </p:spPr>
+        <p:txBody>
+          <a:bodyPr vert="horz" lIns="91440" tIns="45720" rIns="91440" bIns="45720" rtlCol="0" anchor="ctr">
+            <a:normAutofit/>
+          </a:bodyPr>
+          <a:lstStyle/>
+          <a:p>
+            <a:pPr algn="ctr"/>
+            <a:r>
+              <a:rPr lang="en-US" sz="5400" dirty="0">
+                <a:solidFill>
+                  <a:schemeClr val="bg1">
+                    <a:lumMod val="95000"/>
+                    <a:lumOff val="5000"/>
+                  </a:schemeClr>
+                </a:solidFill>
+                <a:latin typeface="Amasis MT Pro Black" panose="02040A04050005020304" pitchFamily="18" charset="0"/>
+              </a:rPr>
+              <a:t>Thank You</a:t>
+            </a:r>
+          </a:p>
+        </p:txBody>
+      </p:sp>
+      <p:sp>
+        <p:nvSpPr>
+          <p:cNvPr id="3" name="Date Placeholder 2">
+            <a:extLst>
+              <a:ext uri="{FF2B5EF4-FFF2-40B4-BE49-F238E27FC236}">
+                <a16:creationId xmlns:a16="http://schemas.microsoft.com/office/drawing/2014/main" id="{9586F742-E910-5E48-06F6-8A86DEC68F0C}"/>
+              </a:ext>
+            </a:extLst>
+          </p:cNvPr>
+          <p:cNvSpPr>
+            <a:spLocks noGrp="1"/>
+          </p:cNvSpPr>
+          <p:nvPr>
+            <p:ph type="dt" sz="half" idx="10"/>
+          </p:nvPr>
+        </p:nvSpPr>
+        <p:spPr/>
+        <p:txBody>
+          <a:bodyPr/>
+          <a:lstStyle/>
+          <a:p>
+            <a:fld id="{121A92AE-D6FC-4EA3-AB09-8AEC31FD403C}" type="datetime8">
+              <a:rPr lang="en-US" smtClean="0"/>
+              <a:t>6/27/2024 7:12 AM</a:t>
+            </a:fld>
+            <a:endParaRPr lang="en-US" dirty="0"/>
+          </a:p>
+        </p:txBody>
+      </p:sp>
+      <p:sp>
+        <p:nvSpPr>
+          <p:cNvPr id="4" name="Slide Number Placeholder 3">
+            <a:extLst>
+              <a:ext uri="{FF2B5EF4-FFF2-40B4-BE49-F238E27FC236}">
+                <a16:creationId xmlns:a16="http://schemas.microsoft.com/office/drawing/2014/main" id="{CCE4DEE3-0397-7174-F06F-67750C28D1CA}"/>
+              </a:ext>
+            </a:extLst>
+          </p:cNvPr>
+          <p:cNvSpPr>
+            <a:spLocks noGrp="1"/>
+          </p:cNvSpPr>
+          <p:nvPr>
+            <p:ph type="sldNum" sz="quarter" idx="12"/>
+          </p:nvPr>
+        </p:nvSpPr>
+        <p:spPr/>
+        <p:txBody>
+          <a:bodyPr/>
+          <a:lstStyle/>
+          <a:p>
+            <a:fld id="{6D22F896-40B5-4ADD-8801-0D06FADFA095}" type="slidenum">
+              <a:rPr lang="en-US" smtClean="0"/>
+              <a:t>50</a:t>
+            </a:fld>
+            <a:endParaRPr lang="en-US" dirty="0"/>
+          </a:p>
+        </p:txBody>
+      </p:sp>
+    </p:spTree>
+    <p:extLst>
+      <p:ext uri="{BB962C8B-B14F-4D97-AF65-F5344CB8AC3E}">
+        <p14:creationId xmlns:p14="http://schemas.microsoft.com/office/powerpoint/2010/main" val="2528430443"/>
       </p:ext>
     </p:extLst>
   </p:cSld>
@@ -14522,7 +15797,7 @@
                   <a:spcPts val="600"/>
                 </a:spcAft>
               </a:pPr>
-              <a:t>6/26/2024 6:38 PM</a:t>
+              <a:t>6/27/2024 7:12 AM</a:t>
             </a:fld>
             <a:endParaRPr lang="en-US"/>
           </a:p>
@@ -14919,7 +16194,7 @@
           <a:p>
             <a:fld id="{A8AD868F-8409-4F04-87B4-D0383043B754}" type="datetime8">
               <a:rPr lang="en-US" smtClean="0"/>
-              <a:t>6/26/2024 6:38 PM</a:t>
+              <a:t>6/27/2024 7:12 AM</a:t>
             </a:fld>
             <a:endParaRPr lang="en-US" dirty="0"/>
           </a:p>
@@ -15659,7 +16934,7 @@
           <a:p>
             <a:fld id="{A8AD868F-8409-4F04-87B4-D0383043B754}" type="datetime8">
               <a:rPr lang="en-US" smtClean="0"/>
-              <a:t>6/26/2024 6:38 PM</a:t>
+              <a:t>6/27/2024 7:12 AM</a:t>
             </a:fld>
             <a:endParaRPr lang="en-US" dirty="0"/>
           </a:p>
@@ -15747,7 +17022,7 @@
           <a:p>
             <a:fld id="{BD53A9F3-9DCE-4543-9F1F-BE2EF1387A7B}" type="datetime8">
               <a:rPr lang="en-US" smtClean="0"/>
-              <a:t>6/26/2024 6:38 PM</a:t>
+              <a:t>6/27/2024 7:12 AM</a:t>
             </a:fld>
             <a:endParaRPr lang="en-US" dirty="0"/>
           </a:p>
@@ -16806,6 +18081,15 @@
 </file>
 
 <file path=customXml/item1.xml><?xml version="1.0" encoding="utf-8"?>
+<?mso-contentType ?>
+<FormTemplates xmlns="http://schemas.microsoft.com/sharepoint/v3/contenttype/forms">
+  <Display>DocumentLibraryForm</Display>
+  <Edit>DocumentLibraryForm</Edit>
+  <New>DocumentLibraryForm</New>
+</FormTemplates>
+</file>
+
+<file path=customXml/item2.xml><?xml version="1.0" encoding="utf-8"?>
 <ct:contentTypeSchema xmlns:ct="http://schemas.microsoft.com/office/2006/metadata/contentType" xmlns:ma="http://schemas.microsoft.com/office/2006/metadata/properties/metaAttributes" ct:_="" ma:_="" ma:contentTypeName="Document" ma:contentTypeID="0x01010079F111ED35F8CC479449609E8A0923A6" ma:contentTypeVersion="11" ma:contentTypeDescription="Create a new document." ma:contentTypeScope="" ma:versionID="96291512c1ee715ab617f4c07df79fc1">
   <xsd:schema xmlns:xsd="http://www.w3.org/2001/XMLSchema" xmlns:xs="http://www.w3.org/2001/XMLSchema" xmlns:p="http://schemas.microsoft.com/office/2006/metadata/properties" xmlns:ns2="71af3243-3dd4-4a8d-8c0d-dd76da1f02a5" xmlns:ns3="16c05727-aa75-4e4a-9b5f-8a80a1165891" targetNamespace="http://schemas.microsoft.com/office/2006/metadata/properties" ma:root="true" ma:fieldsID="8256c27c40ca5c40ce1cf6c44f0205df" ns2:_="" ns3:_="">
     <xsd:import namespace="71af3243-3dd4-4a8d-8c0d-dd76da1f02a5"/>
@@ -17016,7 +18300,7 @@
 </ct:contentTypeSchema>
 </file>
 
-<file path=customXml/item2.xml><?xml version="1.0" encoding="utf-8"?>
+<file path=customXml/item3.xml><?xml version="1.0" encoding="utf-8"?>
 <p:properties xmlns:p="http://schemas.microsoft.com/office/2006/metadata/properties" xmlns:xsi="http://www.w3.org/2001/XMLSchema-instance" xmlns:pc="http://schemas.microsoft.com/office/infopath/2007/PartnerControls">
   <documentManagement>
     <MediaServiceKeyPoints xmlns="71af3243-3dd4-4a8d-8c0d-dd76da1f02a5" xsi:nil="true"/>
@@ -17024,16 +18308,15 @@
 </p:properties>
 </file>
 
-<file path=customXml/item3.xml><?xml version="1.0" encoding="utf-8"?>
-<?mso-contentType ?>
-<FormTemplates xmlns="http://schemas.microsoft.com/sharepoint/v3/contenttype/forms">
-  <Display>DocumentLibraryForm</Display>
-  <Edit>DocumentLibraryForm</Edit>
-  <New>DocumentLibraryForm</New>
-</FormTemplates>
+<file path=customXml/itemProps1.xml><?xml version="1.0" encoding="utf-8"?>
+<ds:datastoreItem xmlns:ds="http://schemas.openxmlformats.org/officeDocument/2006/customXml" ds:itemID="{ABF1ABED-93B7-45AC-A513-2CB1FF159AFF}">
+  <ds:schemaRefs>
+    <ds:schemaRef ds:uri="http://schemas.microsoft.com/sharepoint/v3/contenttype/forms"/>
+  </ds:schemaRefs>
+</ds:datastoreItem>
 </file>
 
-<file path=customXml/itemProps1.xml><?xml version="1.0" encoding="utf-8"?>
+<file path=customXml/itemProps2.xml><?xml version="1.0" encoding="utf-8"?>
 <ds:datastoreItem xmlns:ds="http://schemas.openxmlformats.org/officeDocument/2006/customXml" ds:itemID="{79B27744-7857-4992-B755-05855FC59147}">
   <ds:schemaRefs>
     <ds:schemaRef ds:uri="http://schemas.microsoft.com/office/2006/metadata/contentType"/>
@@ -17052,7 +18335,7 @@
 </ds:datastoreItem>
 </file>
 
-<file path=customXml/itemProps2.xml><?xml version="1.0" encoding="utf-8"?>
+<file path=customXml/itemProps3.xml><?xml version="1.0" encoding="utf-8"?>
 <ds:datastoreItem xmlns:ds="http://schemas.openxmlformats.org/officeDocument/2006/customXml" ds:itemID="{3D6CA70E-ED75-4FF0-A862-8EF12B737755}">
   <ds:schemaRefs>
     <ds:schemaRef ds:uri="http://purl.org/dc/terms/"/>
@@ -17067,12 +18350,4 @@
     <ds:schemaRef ds:uri="http://schemas.microsoft.com/office/2006/metadata/properties"/>
   </ds:schemaRefs>
 </ds:datastoreItem>
-</file>
-
-<file path=customXml/itemProps3.xml><?xml version="1.0" encoding="utf-8"?>
-<ds:datastoreItem xmlns:ds="http://schemas.openxmlformats.org/officeDocument/2006/customXml" ds:itemID="{ABF1ABED-93B7-45AC-A513-2CB1FF159AFF}">
-  <ds:schemaRefs>
-    <ds:schemaRef ds:uri="http://schemas.microsoft.com/sharepoint/v3/contenttype/forms"/>
-  </ds:schemaRefs>
-</ds:datastoreItem>
 </file>
</xml_diff>